<commit_message>
Added code for basic math, also created methods to "shrink" code in Main();
</commit_message>
<xml_diff>
--- a/InputAndOutput/Getting Started With C#.pptx
+++ b/InputAndOutput/Getting Started With C#.pptx
@@ -238,7 +238,7 @@
           <a:p>
             <a:fld id="{1DDD5C4A-C0F6-4925-834E-C7407E04D0BE}" type="datetimeFigureOut">
               <a:rPr lang="en-US" smtClean="0"/>
-              <a:t>9/5/2019</a:t>
+              <a:t>9/7/2019</a:t>
             </a:fld>
             <a:endParaRPr lang="en-US"/>
           </a:p>
@@ -1636,7 +1636,7 @@
           <a:p>
             <a:fld id="{E9EC5426-BC71-417A-947B-B175D58AAA30}" type="datetimeFigureOut">
               <a:rPr lang="en-US" smtClean="0"/>
-              <a:t>9/5/2019</a:t>
+              <a:t>9/7/2019</a:t>
             </a:fld>
             <a:endParaRPr lang="en-US"/>
           </a:p>
@@ -1801,7 +1801,7 @@
           <a:p>
             <a:fld id="{E9EC5426-BC71-417A-947B-B175D58AAA30}" type="datetimeFigureOut">
               <a:rPr lang="en-US" smtClean="0"/>
-              <a:t>9/5/2019</a:t>
+              <a:t>9/7/2019</a:t>
             </a:fld>
             <a:endParaRPr lang="en-US"/>
           </a:p>
@@ -1976,7 +1976,7 @@
           <a:p>
             <a:fld id="{E9EC5426-BC71-417A-947B-B175D58AAA30}" type="datetimeFigureOut">
               <a:rPr lang="en-US" smtClean="0"/>
-              <a:t>9/5/2019</a:t>
+              <a:t>9/7/2019</a:t>
             </a:fld>
             <a:endParaRPr lang="en-US"/>
           </a:p>
@@ -2123,7 +2123,7 @@
           <a:p>
             <a:fld id="{E9EC5426-BC71-417A-947B-B175D58AAA30}" type="datetimeFigureOut">
               <a:rPr lang="en-US" smtClean="0"/>
-              <a:t>9/5/2019</a:t>
+              <a:t>9/7/2019</a:t>
             </a:fld>
             <a:endParaRPr lang="en-US"/>
           </a:p>
@@ -2240,7 +2240,7 @@
           <a:p>
             <a:fld id="{E9EC5426-BC71-417A-947B-B175D58AAA30}" type="datetimeFigureOut">
               <a:rPr lang="en-US" smtClean="0"/>
-              <a:t>9/5/2019</a:t>
+              <a:t>9/7/2019</a:t>
             </a:fld>
             <a:endParaRPr lang="en-US"/>
           </a:p>
@@ -2510,7 +2510,7 @@
           <a:p>
             <a:fld id="{E9EC5426-BC71-417A-947B-B175D58AAA30}" type="datetimeFigureOut">
               <a:rPr lang="en-US" smtClean="0"/>
-              <a:t>9/5/2019</a:t>
+              <a:t>9/7/2019</a:t>
             </a:fld>
             <a:endParaRPr lang="en-US"/>
           </a:p>
@@ -2779,7 +2779,7 @@
           <a:p>
             <a:fld id="{E9EC5426-BC71-417A-947B-B175D58AAA30}" type="datetimeFigureOut">
               <a:rPr lang="en-US" smtClean="0"/>
-              <a:t>9/5/2019</a:t>
+              <a:t>9/7/2019</a:t>
             </a:fld>
             <a:endParaRPr lang="en-US"/>
           </a:p>
@@ -3226,7 +3226,7 @@
           <a:p>
             <a:fld id="{E9EC5426-BC71-417A-947B-B175D58AAA30}" type="datetimeFigureOut">
               <a:rPr lang="en-US" smtClean="0"/>
-              <a:t>9/5/2019</a:t>
+              <a:t>9/7/2019</a:t>
             </a:fld>
             <a:endParaRPr lang="en-US"/>
           </a:p>
@@ -3339,7 +3339,7 @@
           <a:p>
             <a:fld id="{E9EC5426-BC71-417A-947B-B175D58AAA30}" type="datetimeFigureOut">
               <a:rPr lang="en-US" smtClean="0"/>
-              <a:t>9/5/2019</a:t>
+              <a:t>9/7/2019</a:t>
             </a:fld>
             <a:endParaRPr lang="en-US"/>
           </a:p>
@@ -3589,7 +3589,7 @@
           <a:p>
             <a:fld id="{E9EC5426-BC71-417A-947B-B175D58AAA30}" type="datetimeFigureOut">
               <a:rPr lang="en-US" smtClean="0"/>
-              <a:t>9/5/2019</a:t>
+              <a:t>9/7/2019</a:t>
             </a:fld>
             <a:endParaRPr lang="en-US"/>
           </a:p>
@@ -3829,7 +3829,7 @@
           <a:p>
             <a:fld id="{E9EC5426-BC71-417A-947B-B175D58AAA30}" type="datetimeFigureOut">
               <a:rPr lang="en-US" smtClean="0"/>
-              <a:t>9/5/2019</a:t>
+              <a:t>9/7/2019</a:t>
             </a:fld>
             <a:endParaRPr lang="en-US"/>
           </a:p>
@@ -4002,7 +4002,7 @@
           <a:p>
             <a:fld id="{E9EC5426-BC71-417A-947B-B175D58AAA30}" type="datetimeFigureOut">
               <a:rPr lang="en-US" smtClean="0"/>
-              <a:t>9/5/2019</a:t>
+              <a:t>9/7/2019</a:t>
             </a:fld>
             <a:endParaRPr lang="en-US"/>
           </a:p>
@@ -4956,15 +4956,7 @@
                   <a:schemeClr val="bg1"/>
                 </a:solidFill>
               </a:rPr>
-              <a:t>.  </a:t>
-            </a:r>
-            <a:r>
-              <a:rPr lang="en-US" sz="2000" dirty="0" smtClean="0">
-                <a:solidFill>
-                  <a:schemeClr val="bg1"/>
-                </a:solidFill>
-              </a:rPr>
-              <a:t>One is named </a:t>
+              <a:t>.  One is named </a:t>
             </a:r>
             <a:r>
               <a:rPr lang="en-US" sz="2000" b="1" dirty="0" smtClean="0">
@@ -5077,22 +5069,7 @@
                   </a:outerShdw>
                 </a:effectLst>
               </a:rPr>
-              <a:t>Console.WriteLine</a:t>
-            </a:r>
-            <a:r>
-              <a:rPr lang="en-US" sz="2400" dirty="0" smtClean="0">
-                <a:solidFill>
-                  <a:schemeClr val="bg1"/>
-                </a:solidFill>
-                <a:effectLst>
-                  <a:outerShdw blurRad="38100" dist="38100" dir="2700000" algn="tl">
-                    <a:srgbClr val="000000">
-                      <a:alpha val="43137"/>
-                    </a:srgbClr>
-                  </a:outerShdw>
-                </a:effectLst>
-              </a:rPr>
-              <a:t>(c);</a:t>
+              <a:t>Console.WriteLine(c);</a:t>
             </a:r>
           </a:p>
           <a:p>
@@ -5307,11 +5284,6 @@
               </a:rPr>
               <a:t>There is also the Math Namespace that has many mathematical methods.</a:t>
             </a:r>
-            <a:endParaRPr lang="en-US" sz="2000" dirty="0" smtClean="0">
-              <a:solidFill>
-                <a:schemeClr val="bg1"/>
-              </a:solidFill>
-            </a:endParaRPr>
           </a:p>
         </p:txBody>
       </p:sp>
@@ -5685,11 +5657,6 @@
               </a:rPr>
               <a:t>Notice that with integers we lose all of the “remainder” of a number when we divide.  This is because it is an INTEGER. It is a discrete number that throws away all decimal places.</a:t>
             </a:r>
-            <a:endParaRPr lang="en-US" sz="2000" dirty="0" smtClean="0">
-              <a:solidFill>
-                <a:schemeClr val="bg1"/>
-              </a:solidFill>
-            </a:endParaRPr>
           </a:p>
         </p:txBody>
       </p:sp>
@@ -8139,11 +8106,6 @@
               </a:rPr>
               <a:t>What do you think the “--“ will do?</a:t>
             </a:r>
-            <a:endParaRPr lang="en-US" sz="2000" dirty="0" smtClean="0">
-              <a:solidFill>
-                <a:schemeClr val="bg1"/>
-              </a:solidFill>
-            </a:endParaRPr>
           </a:p>
         </p:txBody>
       </p:sp>
@@ -9800,15 +9762,7 @@
                   <a:schemeClr val="bg1"/>
                 </a:solidFill>
               </a:rPr>
-              <a:t>: C</a:t>
-            </a:r>
-            <a:r>
-              <a:rPr lang="en-US" sz="2000" dirty="0" smtClean="0">
-                <a:solidFill>
-                  <a:schemeClr val="bg1"/>
-                </a:solidFill>
-              </a:rPr>
-              <a:t>reate a program to add 2 numbers together and then display the result.</a:t>
+              <a:t>: Create a program to add 2 numbers together and then display the result.</a:t>
             </a:r>
           </a:p>
           <a:p>
@@ -9952,11 +9906,6 @@
               </a:rPr>
               <a:t>for the challenge.</a:t>
             </a:r>
-            <a:endParaRPr lang="en-US" sz="2800" dirty="0" smtClean="0">
-              <a:solidFill>
-                <a:schemeClr val="bg1"/>
-              </a:solidFill>
-            </a:endParaRPr>
           </a:p>
           <a:p>
             <a:pPr lvl="4" algn="ctr"/>
@@ -11050,15 +10999,7 @@
                   <a:srgbClr val="FFFF00"/>
                 </a:solidFill>
               </a:rPr>
-              <a:t>L</a:t>
-            </a:r>
-            <a:r>
-              <a:rPr lang="en-US" b="1" dirty="0" smtClean="0">
-                <a:solidFill>
-                  <a:srgbClr val="FFFF00"/>
-                </a:solidFill>
-              </a:rPr>
-              <a:t>ist&lt;int&gt;</a:t>
+              <a:t>List&lt;int&gt;</a:t>
             </a:r>
             <a:r>
               <a:rPr lang="en-US" dirty="0" smtClean="0">
@@ -11875,11 +11816,7 @@
             </a:r>
             <a:r>
               <a:rPr lang="en-US" dirty="0" smtClean="0"/>
-              <a:t>“default” </a:t>
-            </a:r>
-            <a:r>
-              <a:rPr lang="en-US" dirty="0" smtClean="0"/>
-              <a:t>(i.e. Do not change this setting)</a:t>
+              <a:t>“default” (i.e. Do not change this setting)</a:t>
             </a:r>
           </a:p>
         </p:txBody>
@@ -13889,11 +13826,6 @@
               </a:rPr>
               <a:t>Consider how we could use inheritance for something like Animals.</a:t>
             </a:r>
-            <a:endParaRPr lang="en-US" dirty="0" smtClean="0">
-              <a:solidFill>
-                <a:schemeClr val="bg1"/>
-              </a:solidFill>
-            </a:endParaRPr>
           </a:p>
         </p:txBody>
       </p:sp>
@@ -14674,11 +14606,6 @@
               </a:rPr>
               <a:t>        }</a:t>
             </a:r>
-            <a:endParaRPr lang="en-US" sz="1200" dirty="0" smtClean="0">
-              <a:solidFill>
-                <a:schemeClr val="bg1"/>
-              </a:solidFill>
-            </a:endParaRPr>
           </a:p>
           <a:p>
             <a:r>

</xml_diff>